<commit_message>
Initial Change point: identification and modeling
</commit_message>
<xml_diff>
--- a/Project3/Reports/BIOS6623_Project3_InterimAnalysis.pptx
+++ b/Project3/Reports/BIOS6623_Project3_InterimAnalysis.pptx
@@ -246,7 +246,7 @@
           <a:p>
             <a:fld id="{C632AB85-EA76-4E7C-9ED4-2004BAA68AEA}" type="datetimeFigureOut">
               <a:rPr lang="en-US" smtClean="0"/>
-              <a:t>11/12/2017</a:t>
+              <a:t>11/13/2017</a:t>
             </a:fld>
             <a:endParaRPr lang="en-US"/>
           </a:p>
@@ -416,7 +416,7 @@
           <a:p>
             <a:fld id="{C632AB85-EA76-4E7C-9ED4-2004BAA68AEA}" type="datetimeFigureOut">
               <a:rPr lang="en-US" smtClean="0"/>
-              <a:t>11/12/2017</a:t>
+              <a:t>11/13/2017</a:t>
             </a:fld>
             <a:endParaRPr lang="en-US"/>
           </a:p>
@@ -596,7 +596,7 @@
           <a:p>
             <a:fld id="{C632AB85-EA76-4E7C-9ED4-2004BAA68AEA}" type="datetimeFigureOut">
               <a:rPr lang="en-US" smtClean="0"/>
-              <a:t>11/12/2017</a:t>
+              <a:t>11/13/2017</a:t>
             </a:fld>
             <a:endParaRPr lang="en-US"/>
           </a:p>
@@ -766,7 +766,7 @@
           <a:p>
             <a:fld id="{C632AB85-EA76-4E7C-9ED4-2004BAA68AEA}" type="datetimeFigureOut">
               <a:rPr lang="en-US" smtClean="0"/>
-              <a:t>11/12/2017</a:t>
+              <a:t>11/13/2017</a:t>
             </a:fld>
             <a:endParaRPr lang="en-US"/>
           </a:p>
@@ -1012,7 +1012,7 @@
           <a:p>
             <a:fld id="{C632AB85-EA76-4E7C-9ED4-2004BAA68AEA}" type="datetimeFigureOut">
               <a:rPr lang="en-US" smtClean="0"/>
-              <a:t>11/12/2017</a:t>
+              <a:t>11/13/2017</a:t>
             </a:fld>
             <a:endParaRPr lang="en-US"/>
           </a:p>
@@ -1244,7 +1244,7 @@
           <a:p>
             <a:fld id="{C632AB85-EA76-4E7C-9ED4-2004BAA68AEA}" type="datetimeFigureOut">
               <a:rPr lang="en-US" smtClean="0"/>
-              <a:t>11/12/2017</a:t>
+              <a:t>11/13/2017</a:t>
             </a:fld>
             <a:endParaRPr lang="en-US"/>
           </a:p>
@@ -1611,7 +1611,7 @@
           <a:p>
             <a:fld id="{C632AB85-EA76-4E7C-9ED4-2004BAA68AEA}" type="datetimeFigureOut">
               <a:rPr lang="en-US" smtClean="0"/>
-              <a:t>11/12/2017</a:t>
+              <a:t>11/13/2017</a:t>
             </a:fld>
             <a:endParaRPr lang="en-US"/>
           </a:p>
@@ -1729,7 +1729,7 @@
           <a:p>
             <a:fld id="{C632AB85-EA76-4E7C-9ED4-2004BAA68AEA}" type="datetimeFigureOut">
               <a:rPr lang="en-US" smtClean="0"/>
-              <a:t>11/12/2017</a:t>
+              <a:t>11/13/2017</a:t>
             </a:fld>
             <a:endParaRPr lang="en-US"/>
           </a:p>
@@ -1824,7 +1824,7 @@
           <a:p>
             <a:fld id="{C632AB85-EA76-4E7C-9ED4-2004BAA68AEA}" type="datetimeFigureOut">
               <a:rPr lang="en-US" smtClean="0"/>
-              <a:t>11/12/2017</a:t>
+              <a:t>11/13/2017</a:t>
             </a:fld>
             <a:endParaRPr lang="en-US"/>
           </a:p>
@@ -2101,7 +2101,7 @@
           <a:p>
             <a:fld id="{C632AB85-EA76-4E7C-9ED4-2004BAA68AEA}" type="datetimeFigureOut">
               <a:rPr lang="en-US" smtClean="0"/>
-              <a:t>11/12/2017</a:t>
+              <a:t>11/13/2017</a:t>
             </a:fld>
             <a:endParaRPr lang="en-US"/>
           </a:p>
@@ -2354,7 +2354,7 @@
           <a:p>
             <a:fld id="{C632AB85-EA76-4E7C-9ED4-2004BAA68AEA}" type="datetimeFigureOut">
               <a:rPr lang="en-US" smtClean="0"/>
-              <a:t>11/12/2017</a:t>
+              <a:t>11/13/2017</a:t>
             </a:fld>
             <a:endParaRPr lang="en-US"/>
           </a:p>
@@ -2567,7 +2567,7 @@
           <a:p>
             <a:fld id="{C632AB85-EA76-4E7C-9ED4-2004BAA68AEA}" type="datetimeFigureOut">
               <a:rPr lang="en-US" smtClean="0"/>
-              <a:t>11/12/2017</a:t>
+              <a:t>11/13/2017</a:t>
             </a:fld>
             <a:endParaRPr lang="en-US"/>
           </a:p>
@@ -3114,17 +3114,8 @@
           <a:p>
             <a:r>
               <a:rPr lang="en-US" dirty="0" smtClean="0"/>
-              <a:t>What </a:t>
-            </a:r>
-            <a:r>
-              <a:rPr lang="en-US" dirty="0" smtClean="0"/>
-              <a:t>is the rate of memory </a:t>
-            </a:r>
-            <a:r>
-              <a:rPr lang="en-US" dirty="0" smtClean="0"/>
-              <a:t>decline as participants age?</a:t>
-            </a:r>
-            <a:endParaRPr lang="en-US" dirty="0" smtClean="0"/>
+              <a:t>What is the rate of memory decline as participants age?</a:t>
+            </a:r>
           </a:p>
           <a:p>
             <a:pPr lvl="1"/>
@@ -3132,7 +3123,6 @@
               <a:rPr lang="en-US" dirty="0" smtClean="0"/>
               <a:t>Healthy participants vs. Dementia participants</a:t>
             </a:r>
-            <a:endParaRPr lang="en-US" dirty="0" smtClean="0"/>
           </a:p>
           <a:p>
             <a:pPr lvl="1"/>
@@ -3141,27 +3131,7 @@
           <a:p>
             <a:r>
               <a:rPr lang="en-US" dirty="0" smtClean="0"/>
-              <a:t>Is there a </a:t>
-            </a:r>
-            <a:r>
-              <a:rPr lang="en-US" dirty="0" smtClean="0"/>
-              <a:t>time period before </a:t>
-            </a:r>
-            <a:r>
-              <a:rPr lang="en-US" dirty="0" smtClean="0"/>
-              <a:t>the diagnosis in </a:t>
-            </a:r>
-            <a:r>
-              <a:rPr lang="en-US" dirty="0" smtClean="0"/>
-              <a:t>where the rate </a:t>
-            </a:r>
-            <a:r>
-              <a:rPr lang="en-US" dirty="0" smtClean="0"/>
-              <a:t>of the memory decline </a:t>
-            </a:r>
-            <a:r>
-              <a:rPr lang="en-US" dirty="0" smtClean="0"/>
-              <a:t>changes?</a:t>
+              <a:t>Is there a time period before the diagnosis in where the rate of the memory decline changes?</a:t>
             </a:r>
           </a:p>
           <a:p>
@@ -6528,7 +6498,22 @@
             <a:pPr lvl="1"/>
             <a:r>
               <a:rPr lang="en-US" dirty="0" smtClean="0"/>
-              <a:t>Control for sex, SES, and age</a:t>
+              <a:t>Control for sex, SES, and </a:t>
+            </a:r>
+            <a:r>
+              <a:rPr lang="en-US" dirty="0" smtClean="0"/>
+              <a:t>age</a:t>
+            </a:r>
+          </a:p>
+          <a:p>
+            <a:pPr lvl="1"/>
+            <a:r>
+              <a:rPr lang="en-US" dirty="0" smtClean="0"/>
+              <a:t>One model for </a:t>
+            </a:r>
+            <a:r>
+              <a:rPr lang="en-US" smtClean="0"/>
+              <a:t>each outcome</a:t>
             </a:r>
             <a:endParaRPr lang="en-US" dirty="0" smtClean="0"/>
           </a:p>
@@ -6546,8 +6531,9 @@
             <a:pPr lvl="1"/>
             <a:r>
               <a:rPr lang="en-US" dirty="0" smtClean="0"/>
-              <a:t>Change points and splines</a:t>
-            </a:r>
+              <a:t>Identify a change point before diagnosis</a:t>
+            </a:r>
+            <a:endParaRPr lang="en-US" dirty="0" smtClean="0"/>
           </a:p>
           <a:p>
             <a:pPr lvl="1"/>

</xml_diff>